<commit_message>
worked more on fake data
</commit_message>
<xml_diff>
--- a/201update.pptx
+++ b/201update.pptx
@@ -5,7 +5,7 @@
     <p:sldMasterId id="2147483648" r:id="rId1"/>
   </p:sldMasterIdLst>
   <p:notesMasterIdLst>
-    <p:notesMasterId r:id="rId10"/>
+    <p:notesMasterId r:id="rId13"/>
   </p:notesMasterIdLst>
   <p:sldIdLst>
     <p:sldId id="256" r:id="rId2"/>
@@ -16,6 +16,9 @@
     <p:sldId id="260" r:id="rId7"/>
     <p:sldId id="262" r:id="rId8"/>
     <p:sldId id="263" r:id="rId9"/>
+    <p:sldId id="264" r:id="rId10"/>
+    <p:sldId id="266" r:id="rId11"/>
+    <p:sldId id="265" r:id="rId12"/>
   </p:sldIdLst>
   <p:sldSz cx="9144000" cy="6858000" type="screen4x3"/>
   <p:notesSz cx="6858000" cy="9144000"/>
@@ -199,7 +202,7 @@
           <a:p>
             <a:fld id="{E8DA6595-B6DB-D447-B2C7-40807C74DF9A}" type="datetimeFigureOut">
               <a:rPr lang="en-US" smtClean="0"/>
-              <a:t>10/30/17</a:t>
+              <a:t>10/31/17</a:t>
             </a:fld>
             <a:endParaRPr lang="en-US"/>
           </a:p>
@@ -820,7 +823,7 @@
           <a:p>
             <a:fld id="{4947EEFC-3321-7C47-9433-5B7EB31E85BD}" type="datetimeFigureOut">
               <a:rPr lang="en-US" smtClean="0"/>
-              <a:t>10/30/17</a:t>
+              <a:t>10/31/17</a:t>
             </a:fld>
             <a:endParaRPr lang="en-US"/>
           </a:p>
@@ -990,7 +993,7 @@
           <a:p>
             <a:fld id="{4947EEFC-3321-7C47-9433-5B7EB31E85BD}" type="datetimeFigureOut">
               <a:rPr lang="en-US" smtClean="0"/>
-              <a:t>10/30/17</a:t>
+              <a:t>10/31/17</a:t>
             </a:fld>
             <a:endParaRPr lang="en-US"/>
           </a:p>
@@ -1170,7 +1173,7 @@
           <a:p>
             <a:fld id="{4947EEFC-3321-7C47-9433-5B7EB31E85BD}" type="datetimeFigureOut">
               <a:rPr lang="en-US" smtClean="0"/>
-              <a:t>10/30/17</a:t>
+              <a:t>10/31/17</a:t>
             </a:fld>
             <a:endParaRPr lang="en-US"/>
           </a:p>
@@ -1340,7 +1343,7 @@
           <a:p>
             <a:fld id="{4947EEFC-3321-7C47-9433-5B7EB31E85BD}" type="datetimeFigureOut">
               <a:rPr lang="en-US" smtClean="0"/>
-              <a:t>10/30/17</a:t>
+              <a:t>10/31/17</a:t>
             </a:fld>
             <a:endParaRPr lang="en-US"/>
           </a:p>
@@ -1586,7 +1589,7 @@
           <a:p>
             <a:fld id="{4947EEFC-3321-7C47-9433-5B7EB31E85BD}" type="datetimeFigureOut">
               <a:rPr lang="en-US" smtClean="0"/>
-              <a:t>10/30/17</a:t>
+              <a:t>10/31/17</a:t>
             </a:fld>
             <a:endParaRPr lang="en-US"/>
           </a:p>
@@ -1874,7 +1877,7 @@
           <a:p>
             <a:fld id="{4947EEFC-3321-7C47-9433-5B7EB31E85BD}" type="datetimeFigureOut">
               <a:rPr lang="en-US" smtClean="0"/>
-              <a:t>10/30/17</a:t>
+              <a:t>10/31/17</a:t>
             </a:fld>
             <a:endParaRPr lang="en-US"/>
           </a:p>
@@ -2296,7 +2299,7 @@
           <a:p>
             <a:fld id="{4947EEFC-3321-7C47-9433-5B7EB31E85BD}" type="datetimeFigureOut">
               <a:rPr lang="en-US" smtClean="0"/>
-              <a:t>10/30/17</a:t>
+              <a:t>10/31/17</a:t>
             </a:fld>
             <a:endParaRPr lang="en-US"/>
           </a:p>
@@ -2414,7 +2417,7 @@
           <a:p>
             <a:fld id="{4947EEFC-3321-7C47-9433-5B7EB31E85BD}" type="datetimeFigureOut">
               <a:rPr lang="en-US" smtClean="0"/>
-              <a:t>10/30/17</a:t>
+              <a:t>10/31/17</a:t>
             </a:fld>
             <a:endParaRPr lang="en-US"/>
           </a:p>
@@ -2509,7 +2512,7 @@
           <a:p>
             <a:fld id="{4947EEFC-3321-7C47-9433-5B7EB31E85BD}" type="datetimeFigureOut">
               <a:rPr lang="en-US" smtClean="0"/>
-              <a:t>10/30/17</a:t>
+              <a:t>10/31/17</a:t>
             </a:fld>
             <a:endParaRPr lang="en-US"/>
           </a:p>
@@ -2786,7 +2789,7 @@
           <a:p>
             <a:fld id="{4947EEFC-3321-7C47-9433-5B7EB31E85BD}" type="datetimeFigureOut">
               <a:rPr lang="en-US" smtClean="0"/>
-              <a:t>10/30/17</a:t>
+              <a:t>10/31/17</a:t>
             </a:fld>
             <a:endParaRPr lang="en-US"/>
           </a:p>
@@ -3039,7 +3042,7 @@
           <a:p>
             <a:fld id="{4947EEFC-3321-7C47-9433-5B7EB31E85BD}" type="datetimeFigureOut">
               <a:rPr lang="en-US" smtClean="0"/>
-              <a:t>10/30/17</a:t>
+              <a:t>10/31/17</a:t>
             </a:fld>
             <a:endParaRPr lang="en-US"/>
           </a:p>
@@ -3252,7 +3255,7 @@
           <a:p>
             <a:fld id="{4947EEFC-3321-7C47-9433-5B7EB31E85BD}" type="datetimeFigureOut">
               <a:rPr lang="en-US" smtClean="0"/>
-              <a:t>10/30/17</a:t>
+              <a:t>10/31/17</a:t>
             </a:fld>
             <a:endParaRPr lang="en-US"/>
           </a:p>
@@ -3651,20 +3654,34 @@
           <a:p>
             <a:r>
               <a:rPr lang="en-US" dirty="0" smtClean="0"/>
-              <a:t>A </a:t>
-            </a:r>
-            <a:r>
-              <a:rPr lang="en-US" dirty="0"/>
-              <a:t>b</a:t>
-            </a:r>
-            <a:r>
-              <a:rPr lang="en-US" dirty="0" smtClean="0"/>
-              <a:t>udding project on buds</a:t>
+              <a:t/>
             </a:r>
             <a:br>
               <a:rPr lang="en-US" dirty="0" smtClean="0"/>
             </a:br>
             <a:r>
+              <a:rPr lang="en-US" dirty="0"/>
+              <a:t/>
+            </a:r>
+            <a:br>
+              <a:rPr lang="en-US" dirty="0"/>
+            </a:br>
+            <a:r>
+              <a:rPr lang="en-US" dirty="0" smtClean="0"/>
+              <a:t>A </a:t>
+            </a:r>
+            <a:r>
+              <a:rPr lang="en-US" dirty="0"/>
+              <a:t>b</a:t>
+            </a:r>
+            <a:r>
+              <a:rPr lang="en-US" dirty="0" smtClean="0"/>
+              <a:t>udding project on buds</a:t>
+            </a:r>
+            <a:br>
+              <a:rPr lang="en-US" dirty="0" smtClean="0"/>
+            </a:br>
+            <a:r>
               <a:rPr lang="en-US" dirty="0" smtClean="0"/>
               <a:t> </a:t>
             </a:r>
@@ -3674,9 +3691,34 @@
             </a:r>
             <a:r>
               <a:rPr lang="en-US" dirty="0" smtClean="0"/>
-              <a:t> An emerging project on leaf emergence</a:t>
-            </a:r>
-            <a:endParaRPr lang="en-US" dirty="0"/>
+              <a:t> An emerging project on leaf </a:t>
+            </a:r>
+            <a:r>
+              <a:rPr lang="en-US" dirty="0" smtClean="0"/>
+              <a:t>emergence</a:t>
+            </a:r>
+            <a:br>
+              <a:rPr lang="en-US" dirty="0" smtClean="0"/>
+            </a:br>
+            <a:r>
+              <a:rPr lang="en-US" sz="3100" dirty="0"/>
+              <a:t/>
+            </a:r>
+            <a:br>
+              <a:rPr lang="en-US" sz="3100" dirty="0"/>
+            </a:br>
+            <a:r>
+              <a:rPr lang="en-US" sz="3100" dirty="0" smtClean="0"/>
+              <a:t>Dan Buonaiuto</a:t>
+            </a:r>
+            <a:br>
+              <a:rPr lang="en-US" sz="3100" dirty="0" smtClean="0"/>
+            </a:br>
+            <a:r>
+              <a:rPr lang="en-US" sz="3100" dirty="0" smtClean="0"/>
+              <a:t>OEB 201</a:t>
+            </a:r>
+            <a:endParaRPr lang="en-US" sz="3100" dirty="0"/>
           </a:p>
         </p:txBody>
       </p:sp>
@@ -3684,6 +3726,203 @@
     <p:extLst>
       <p:ext uri="{BB962C8B-B14F-4D97-AF65-F5344CB8AC3E}">
         <p14:creationId xmlns:p14="http://schemas.microsoft.com/office/powerpoint/2010/main" val="2623669783"/>
+      </p:ext>
+    </p:extLst>
+  </p:cSld>
+  <p:clrMapOvr>
+    <a:masterClrMapping/>
+  </p:clrMapOvr>
+</p:sld>
+</file>
+
+<file path=ppt/slides/slide10.xml><?xml version="1.0" encoding="utf-8"?>
+<p:sld xmlns:a="http://schemas.openxmlformats.org/drawingml/2006/main" xmlns:r="http://schemas.openxmlformats.org/officeDocument/2006/relationships" xmlns:p="http://schemas.openxmlformats.org/presentationml/2006/main">
+  <p:cSld>
+    <p:spTree>
+      <p:nvGrpSpPr>
+        <p:cNvPr id="1" name=""/>
+        <p:cNvGrpSpPr/>
+        <p:nvPr/>
+      </p:nvGrpSpPr>
+      <p:grpSpPr>
+        <a:xfrm>
+          <a:off x="0" y="0"/>
+          <a:ext cx="0" cy="0"/>
+          <a:chOff x="0" y="0"/>
+          <a:chExt cx="0" cy="0"/>
+        </a:xfrm>
+      </p:grpSpPr>
+      <p:sp>
+        <p:nvSpPr>
+          <p:cNvPr id="2" name="Title 1"/>
+          <p:cNvSpPr>
+            <a:spLocks noGrp="1"/>
+          </p:cNvSpPr>
+          <p:nvPr>
+            <p:ph type="title"/>
+          </p:nvPr>
+        </p:nvSpPr>
+        <p:spPr/>
+        <p:txBody>
+          <a:bodyPr/>
+          <a:lstStyle/>
+          <a:p>
+            <a:r>
+              <a:rPr lang="en-US" dirty="0" smtClean="0"/>
+              <a:t>Real data</a:t>
+            </a:r>
+            <a:endParaRPr lang="en-US" dirty="0"/>
+          </a:p>
+        </p:txBody>
+      </p:sp>
+      <p:pic>
+        <p:nvPicPr>
+          <p:cNvPr id="6" name="Content Placeholder 5" descr="real_dat_ppc.pdf"/>
+          <p:cNvPicPr>
+            <a:picLocks noGrp="1" noChangeAspect="1"/>
+          </p:cNvPicPr>
+          <p:nvPr>
+            <p:ph idx="1"/>
+          </p:nvPr>
+        </p:nvPicPr>
+        <p:blipFill rotWithShape="1">
+          <a:blip r:embed="rId2">
+            <a:extLst>
+              <a:ext uri="{28A0092B-C50C-407E-A947-70E740481C1C}">
+                <a14:useLocalDpi xmlns:a14="http://schemas.microsoft.com/office/drawing/2010/main" val="0"/>
+              </a:ext>
+            </a:extLst>
+          </a:blip>
+          <a:srcRect l="129" r="30214"/>
+          <a:stretch/>
+        </p:blipFill>
+        <p:spPr>
+          <a:xfrm>
+            <a:off x="1651000" y="274638"/>
+            <a:ext cx="5397500" cy="5987655"/>
+          </a:xfrm>
+          <a:prstGeom prst="rect">
+            <a:avLst/>
+          </a:prstGeom>
+          <a:ln>
+            <a:noFill/>
+          </a:ln>
+          <a:effectLst>
+            <a:outerShdw blurRad="292100" dist="139700" dir="2700000" algn="tl" rotWithShape="0">
+              <a:srgbClr val="333333">
+                <a:alpha val="65000"/>
+              </a:srgbClr>
+            </a:outerShdw>
+          </a:effectLst>
+        </p:spPr>
+      </p:pic>
+    </p:spTree>
+    <p:extLst>
+      <p:ext uri="{BB962C8B-B14F-4D97-AF65-F5344CB8AC3E}">
+        <p14:creationId xmlns:p14="http://schemas.microsoft.com/office/powerpoint/2010/main" val="3435842230"/>
+      </p:ext>
+    </p:extLst>
+  </p:cSld>
+  <p:clrMapOvr>
+    <a:masterClrMapping/>
+  </p:clrMapOvr>
+</p:sld>
+</file>
+
+<file path=ppt/slides/slide11.xml><?xml version="1.0" encoding="utf-8"?>
+<p:sld xmlns:a="http://schemas.openxmlformats.org/drawingml/2006/main" xmlns:r="http://schemas.openxmlformats.org/officeDocument/2006/relationships" xmlns:p="http://schemas.openxmlformats.org/presentationml/2006/main">
+  <p:cSld>
+    <p:spTree>
+      <p:nvGrpSpPr>
+        <p:cNvPr id="1" name=""/>
+        <p:cNvGrpSpPr/>
+        <p:nvPr/>
+      </p:nvGrpSpPr>
+      <p:grpSpPr>
+        <a:xfrm>
+          <a:off x="0" y="0"/>
+          <a:ext cx="0" cy="0"/>
+          <a:chOff x="0" y="0"/>
+          <a:chExt cx="0" cy="0"/>
+        </a:xfrm>
+      </p:grpSpPr>
+      <p:sp>
+        <p:nvSpPr>
+          <p:cNvPr id="2" name="Title 1"/>
+          <p:cNvSpPr>
+            <a:spLocks noGrp="1"/>
+          </p:cNvSpPr>
+          <p:nvPr>
+            <p:ph type="title"/>
+          </p:nvPr>
+        </p:nvSpPr>
+        <p:spPr/>
+        <p:txBody>
+          <a:bodyPr/>
+          <a:lstStyle/>
+          <a:p>
+            <a:r>
+              <a:rPr lang="en-US" dirty="0" smtClean="0"/>
+              <a:t>Next steps</a:t>
+            </a:r>
+            <a:endParaRPr lang="en-US" dirty="0"/>
+          </a:p>
+        </p:txBody>
+      </p:sp>
+      <p:sp>
+        <p:nvSpPr>
+          <p:cNvPr id="3" name="Content Placeholder 2"/>
+          <p:cNvSpPr>
+            <a:spLocks noGrp="1"/>
+          </p:cNvSpPr>
+          <p:nvPr>
+            <p:ph idx="1"/>
+          </p:nvPr>
+        </p:nvSpPr>
+        <p:spPr>
+          <a:xfrm>
+            <a:off x="457200" y="1600201"/>
+            <a:ext cx="8229600" cy="3257550"/>
+          </a:xfrm>
+        </p:spPr>
+        <p:txBody>
+          <a:bodyPr/>
+          <a:lstStyle/>
+          <a:p>
+            <a:r>
+              <a:rPr lang="en-US" dirty="0" smtClean="0"/>
+              <a:t>Improve fake data</a:t>
+            </a:r>
+          </a:p>
+          <a:p>
+            <a:r>
+              <a:rPr lang="en-US" dirty="0" smtClean="0"/>
+              <a:t>Better method/script for bias correct?</a:t>
+            </a:r>
+          </a:p>
+          <a:p>
+            <a:r>
+              <a:rPr lang="en-US" dirty="0" smtClean="0"/>
+              <a:t>What’s the deal with real data???</a:t>
+            </a:r>
+          </a:p>
+          <a:p>
+            <a:r>
+              <a:rPr lang="en-US" dirty="0" smtClean="0"/>
+              <a:t>rough model to predict phenology from </a:t>
+            </a:r>
+            <a:r>
+              <a:rPr lang="en-US" dirty="0" err="1" smtClean="0"/>
+              <a:t>tru.bud.vol</a:t>
+            </a:r>
+            <a:endParaRPr lang="en-US" dirty="0"/>
+          </a:p>
+        </p:txBody>
+      </p:sp>
+    </p:spTree>
+    <p:extLst>
+      <p:ext uri="{BB962C8B-B14F-4D97-AF65-F5344CB8AC3E}">
+        <p14:creationId xmlns:p14="http://schemas.microsoft.com/office/powerpoint/2010/main" val="1344783042"/>
       </p:ext>
     </p:extLst>
   </p:cSld>
@@ -3738,17 +3977,15 @@
           <a:prstGeom prst="rect">
             <a:avLst/>
           </a:prstGeom>
-          <a:ln w="228600" cap="sq" cmpd="thickThin">
-            <a:solidFill>
-              <a:srgbClr val="000000"/>
-            </a:solidFill>
-            <a:prstDash val="solid"/>
-            <a:miter lim="800000"/>
+          <a:ln>
+            <a:noFill/>
           </a:ln>
           <a:effectLst>
-            <a:innerShdw blurRad="76200">
-              <a:srgbClr val="000000"/>
-            </a:innerShdw>
+            <a:outerShdw blurRad="292100" dist="139700" dir="2700000" algn="tl" rotWithShape="0">
+              <a:srgbClr val="333333">
+                <a:alpha val="65000"/>
+              </a:srgbClr>
+            </a:outerShdw>
           </a:effectLst>
         </p:spPr>
       </p:pic>
@@ -3780,17 +4017,15 @@
           <a:prstGeom prst="rect">
             <a:avLst/>
           </a:prstGeom>
-          <a:ln w="228600" cap="sq" cmpd="thickThin">
-            <a:solidFill>
-              <a:srgbClr val="000000"/>
-            </a:solidFill>
-            <a:prstDash val="solid"/>
-            <a:miter lim="800000"/>
+          <a:ln>
+            <a:noFill/>
           </a:ln>
           <a:effectLst>
-            <a:innerShdw blurRad="76200">
-              <a:srgbClr val="000000"/>
-            </a:innerShdw>
+            <a:outerShdw blurRad="292100" dist="139700" dir="2700000" algn="tl" rotWithShape="0">
+              <a:srgbClr val="333333">
+                <a:alpha val="65000"/>
+              </a:srgbClr>
+            </a:outerShdw>
           </a:effectLst>
         </p:spPr>
       </p:pic>
@@ -3919,8 +4154,8 @@
         </p:nvSpPr>
         <p:spPr>
           <a:xfrm>
-            <a:off x="1848538" y="5234444"/>
-            <a:ext cx="4192992" cy="646331"/>
+            <a:off x="566615" y="5234444"/>
+            <a:ext cx="7170616" cy="954107"/>
           </a:xfrm>
           <a:prstGeom prst="rect">
             <a:avLst/>
@@ -3947,17 +4182,26 @@
           <a:lstStyle/>
           <a:p>
             <a:r>
-              <a:rPr lang="en-US" b="1" dirty="0" smtClean="0"/>
+              <a:rPr lang="en-US" sz="2800" b="1" dirty="0" smtClean="0"/>
               <a:t>Does bud size predict </a:t>
             </a:r>
             <a:r>
-              <a:rPr lang="en-US" b="1" dirty="0" err="1" smtClean="0"/>
+              <a:rPr lang="en-US" sz="2800" b="1" dirty="0" err="1" smtClean="0"/>
               <a:t>phenological</a:t>
             </a:r>
             <a:r>
-              <a:rPr lang="en-US" b="1" dirty="0" smtClean="0"/>
-              <a:t> rank?</a:t>
-            </a:r>
+              <a:rPr lang="en-US" sz="2800" b="1" dirty="0" smtClean="0"/>
+              <a:t> </a:t>
+            </a:r>
+            <a:r>
+              <a:rPr lang="en-US" sz="2800" b="1" dirty="0" smtClean="0"/>
+              <a:t>patterns</a:t>
+            </a:r>
+            <a:r>
+              <a:rPr lang="en-US" sz="2800" b="1" dirty="0" smtClean="0"/>
+              <a:t>?</a:t>
+            </a:r>
+            <a:endParaRPr lang="en-US" sz="2800" b="1" dirty="0" smtClean="0"/>
           </a:p>
           <a:p>
             <a:pPr marL="285750" indent="-285750">
@@ -3965,7 +4209,7 @@
               <a:buChar char="•"/>
             </a:pPr>
             <a:r>
-              <a:rPr lang="en-US" dirty="0" smtClean="0"/>
+              <a:rPr lang="en-US" sz="2800" dirty="0" smtClean="0"/>
               <a:t>Inter and intra-species differences</a:t>
             </a:r>
           </a:p>
@@ -4029,36 +4273,16 @@
           <a:prstGeom prst="rect">
             <a:avLst/>
           </a:prstGeom>
-          <a:solidFill>
-            <a:srgbClr val="FFFFFF">
-              <a:shade val="85000"/>
-            </a:srgbClr>
-          </a:solidFill>
-          <a:ln w="88900" cap="sq">
-            <a:solidFill>
-              <a:srgbClr val="FFFFFF"/>
-            </a:solidFill>
-            <a:miter lim="800000"/>
+          <a:ln>
+            <a:noFill/>
           </a:ln>
           <a:effectLst>
-            <a:outerShdw blurRad="55000" dist="18000" dir="5400000" algn="tl" rotWithShape="0">
-              <a:srgbClr val="000000">
-                <a:alpha val="40000"/>
+            <a:outerShdw blurRad="292100" dist="139700" dir="2700000" algn="tl" rotWithShape="0">
+              <a:srgbClr val="333333">
+                <a:alpha val="65000"/>
               </a:srgbClr>
             </a:outerShdw>
           </a:effectLst>
-          <a:scene3d>
-            <a:camera prst="orthographicFront"/>
-            <a:lightRig rig="twoPt" dir="t">
-              <a:rot lat="0" lon="0" rev="7200000"/>
-            </a:lightRig>
-          </a:scene3d>
-          <a:sp3d>
-            <a:bevelT w="25400" h="19050"/>
-            <a:contourClr>
-              <a:srgbClr val="FFFFFF"/>
-            </a:contourClr>
-          </a:sp3d>
         </p:spPr>
       </p:pic>
     </p:spTree>
@@ -4123,7 +4347,7 @@
         </p:style>
         <p:txBody>
           <a:bodyPr>
-            <a:normAutofit/>
+            <a:normAutofit fontScale="92500" lnSpcReduction="20000"/>
           </a:bodyPr>
           <a:lstStyle/>
           <a:p>
@@ -4142,7 +4366,14 @@
                 <a:latin typeface="Avenir Black"/>
                 <a:cs typeface="Avenir Black"/>
               </a:rPr>
-              <a:t>day∼av.bud.vol</a:t>
+              <a:t>day</a:t>
+            </a:r>
+            <a:r>
+              <a:rPr lang="en-US" sz="2800" dirty="0" err="1" smtClean="0">
+                <a:latin typeface="Avenir Black"/>
+                <a:cs typeface="Avenir Black"/>
+              </a:rPr>
+              <a:t>∼true.av.bud.vol</a:t>
             </a:r>
             <a:r>
               <a:rPr lang="en-US" sz="2800" dirty="0" smtClean="0">
@@ -4350,33 +4581,244 @@
       </p:sp>
       <p:sp>
         <p:nvSpPr>
-          <p:cNvPr id="6" name="TextBox 5"/>
-          <p:cNvSpPr txBox="1"/>
+          <p:cNvPr id="5" name="Content Placeholder 2"/>
+          <p:cNvSpPr txBox="1">
+            <a:spLocks/>
+          </p:cNvSpPr>
           <p:nvPr/>
         </p:nvSpPr>
         <p:spPr>
           <a:xfrm>
-            <a:off x="177417" y="2301595"/>
-            <a:ext cx="5686695" cy="646331"/>
+            <a:off x="177417" y="3785098"/>
+            <a:ext cx="8777493" cy="1194310"/>
           </a:xfrm>
           <a:prstGeom prst="rect">
             <a:avLst/>
           </a:prstGeom>
-          <a:noFill/>
         </p:spPr>
-        <p:txBody>
-          <a:bodyPr wrap="square" rtlCol="0">
-            <a:spAutoFit/>
+        <p:style>
+          <a:lnRef idx="2">
+            <a:schemeClr val="accent2"/>
+          </a:lnRef>
+          <a:fillRef idx="1">
+            <a:schemeClr val="lt1"/>
+          </a:fillRef>
+          <a:effectRef idx="0">
+            <a:schemeClr val="accent2"/>
+          </a:effectRef>
+          <a:fontRef idx="minor">
+            <a:schemeClr val="dk1"/>
+          </a:fontRef>
+        </p:style>
+        <p:txBody>
+          <a:bodyPr vert="horz" lIns="91440" tIns="45720" rIns="91440" bIns="45720" rtlCol="0">
+            <a:normAutofit/>
           </a:bodyPr>
-          <a:lstStyle/>
-          <a:p>
-            <a:r>
-              <a:rPr lang="en-US" dirty="0" smtClean="0"/>
-              <a:t>Should I vary the slope by species?</a:t>
-            </a:r>
-          </a:p>
-          <a:p>
-            <a:endParaRPr lang="en-US" dirty="0"/>
+          <a:lstStyle>
+            <a:lvl1pPr marL="342900" indent="-342900" algn="l" defTabSz="457200" rtl="0" eaLnBrk="1" latinLnBrk="0" hangingPunct="1">
+              <a:spcBef>
+                <a:spcPct val="20000"/>
+              </a:spcBef>
+              <a:buFont typeface="Arial"/>
+              <a:buChar char="•"/>
+              <a:defRPr sz="3200" kern="1200">
+                <a:solidFill>
+                  <a:schemeClr val="dk1"/>
+                </a:solidFill>
+                <a:latin typeface="+mn-lt"/>
+                <a:ea typeface="+mn-ea"/>
+                <a:cs typeface="+mn-cs"/>
+              </a:defRPr>
+            </a:lvl1pPr>
+            <a:lvl2pPr marL="742950" indent="-285750" algn="l" defTabSz="457200" rtl="0" eaLnBrk="1" latinLnBrk="0" hangingPunct="1">
+              <a:spcBef>
+                <a:spcPct val="20000"/>
+              </a:spcBef>
+              <a:buFont typeface="Arial"/>
+              <a:buChar char="–"/>
+              <a:defRPr sz="2800" kern="1200">
+                <a:solidFill>
+                  <a:schemeClr val="dk1"/>
+                </a:solidFill>
+                <a:latin typeface="+mn-lt"/>
+                <a:ea typeface="+mn-ea"/>
+                <a:cs typeface="+mn-cs"/>
+              </a:defRPr>
+            </a:lvl2pPr>
+            <a:lvl3pPr marL="1143000" indent="-228600" algn="l" defTabSz="457200" rtl="0" eaLnBrk="1" latinLnBrk="0" hangingPunct="1">
+              <a:spcBef>
+                <a:spcPct val="20000"/>
+              </a:spcBef>
+              <a:buFont typeface="Arial"/>
+              <a:buChar char="•"/>
+              <a:defRPr sz="2400" kern="1200">
+                <a:solidFill>
+                  <a:schemeClr val="dk1"/>
+                </a:solidFill>
+                <a:latin typeface="+mn-lt"/>
+                <a:ea typeface="+mn-ea"/>
+                <a:cs typeface="+mn-cs"/>
+              </a:defRPr>
+            </a:lvl3pPr>
+            <a:lvl4pPr marL="1600200" indent="-228600" algn="l" defTabSz="457200" rtl="0" eaLnBrk="1" latinLnBrk="0" hangingPunct="1">
+              <a:spcBef>
+                <a:spcPct val="20000"/>
+              </a:spcBef>
+              <a:buFont typeface="Arial"/>
+              <a:buChar char="–"/>
+              <a:defRPr sz="2000" kern="1200">
+                <a:solidFill>
+                  <a:schemeClr val="dk1"/>
+                </a:solidFill>
+                <a:latin typeface="+mn-lt"/>
+                <a:ea typeface="+mn-ea"/>
+                <a:cs typeface="+mn-cs"/>
+              </a:defRPr>
+            </a:lvl4pPr>
+            <a:lvl5pPr marL="2057400" indent="-228600" algn="l" defTabSz="457200" rtl="0" eaLnBrk="1" latinLnBrk="0" hangingPunct="1">
+              <a:spcBef>
+                <a:spcPct val="20000"/>
+              </a:spcBef>
+              <a:buFont typeface="Arial"/>
+              <a:buChar char="»"/>
+              <a:defRPr sz="2000" kern="1200">
+                <a:solidFill>
+                  <a:schemeClr val="dk1"/>
+                </a:solidFill>
+                <a:latin typeface="+mn-lt"/>
+                <a:ea typeface="+mn-ea"/>
+                <a:cs typeface="+mn-cs"/>
+              </a:defRPr>
+            </a:lvl5pPr>
+            <a:lvl6pPr marL="2514600" indent="-228600" algn="l" defTabSz="457200" rtl="0" eaLnBrk="1" latinLnBrk="0" hangingPunct="1">
+              <a:spcBef>
+                <a:spcPct val="20000"/>
+              </a:spcBef>
+              <a:buFont typeface="Arial"/>
+              <a:buChar char="•"/>
+              <a:defRPr sz="2000" kern="1200">
+                <a:solidFill>
+                  <a:schemeClr val="dk1"/>
+                </a:solidFill>
+                <a:latin typeface="+mn-lt"/>
+                <a:ea typeface="+mn-ea"/>
+                <a:cs typeface="+mn-cs"/>
+              </a:defRPr>
+            </a:lvl6pPr>
+            <a:lvl7pPr marL="2971800" indent="-228600" algn="l" defTabSz="457200" rtl="0" eaLnBrk="1" latinLnBrk="0" hangingPunct="1">
+              <a:spcBef>
+                <a:spcPct val="20000"/>
+              </a:spcBef>
+              <a:buFont typeface="Arial"/>
+              <a:buChar char="•"/>
+              <a:defRPr sz="2000" kern="1200">
+                <a:solidFill>
+                  <a:schemeClr val="dk1"/>
+                </a:solidFill>
+                <a:latin typeface="+mn-lt"/>
+                <a:ea typeface="+mn-ea"/>
+                <a:cs typeface="+mn-cs"/>
+              </a:defRPr>
+            </a:lvl7pPr>
+            <a:lvl8pPr marL="3429000" indent="-228600" algn="l" defTabSz="457200" rtl="0" eaLnBrk="1" latinLnBrk="0" hangingPunct="1">
+              <a:spcBef>
+                <a:spcPct val="20000"/>
+              </a:spcBef>
+              <a:buFont typeface="Arial"/>
+              <a:buChar char="•"/>
+              <a:defRPr sz="2000" kern="1200">
+                <a:solidFill>
+                  <a:schemeClr val="dk1"/>
+                </a:solidFill>
+                <a:latin typeface="+mn-lt"/>
+                <a:ea typeface="+mn-ea"/>
+                <a:cs typeface="+mn-cs"/>
+              </a:defRPr>
+            </a:lvl8pPr>
+            <a:lvl9pPr marL="3886200" indent="-228600" algn="l" defTabSz="457200" rtl="0" eaLnBrk="1" latinLnBrk="0" hangingPunct="1">
+              <a:spcBef>
+                <a:spcPct val="20000"/>
+              </a:spcBef>
+              <a:buFont typeface="Arial"/>
+              <a:buChar char="•"/>
+              <a:defRPr sz="2000" kern="1200">
+                <a:solidFill>
+                  <a:schemeClr val="dk1"/>
+                </a:solidFill>
+                <a:latin typeface="+mn-lt"/>
+                <a:ea typeface="+mn-ea"/>
+                <a:cs typeface="+mn-cs"/>
+              </a:defRPr>
+            </a:lvl9pPr>
+          </a:lstStyle>
+          <a:p>
+            <a:r>
+              <a:rPr lang="en-US" sz="2600" dirty="0" err="1" smtClean="0">
+                <a:latin typeface="Avenir Black"/>
+                <a:cs typeface="Avenir Black"/>
+              </a:rPr>
+              <a:t>budvol~doy</a:t>
+            </a:r>
+            <a:r>
+              <a:rPr lang="en-US" sz="2600" dirty="0" smtClean="0">
+                <a:latin typeface="Avenir Black"/>
+                <a:cs typeface="Avenir Black"/>
+              </a:rPr>
+              <a:t>+(1+doy|sp) </a:t>
+            </a:r>
+            <a:endParaRPr lang="en-US" sz="2600" dirty="0">
+              <a:latin typeface="Avenir Black"/>
+              <a:cs typeface="Avenir Black"/>
+              <a:sym typeface="Wingdings"/>
+            </a:endParaRPr>
+          </a:p>
+          <a:p>
+            <a:r>
+              <a:rPr lang="en-US" sz="2600" dirty="0" err="1" smtClean="0">
+                <a:latin typeface="Avenir Black"/>
+                <a:cs typeface="Avenir Black"/>
+              </a:rPr>
+              <a:t>trubudvol</a:t>
+            </a:r>
+            <a:r>
+              <a:rPr lang="en-US" sz="2600" dirty="0" smtClean="0">
+                <a:latin typeface="Avenir Black"/>
+                <a:cs typeface="Avenir Black"/>
+              </a:rPr>
+              <a:t>=</a:t>
+            </a:r>
+            <a:r>
+              <a:rPr lang="en-US" sz="2600" dirty="0" err="1" smtClean="0">
+                <a:latin typeface="Avenir Black"/>
+                <a:cs typeface="Avenir Black"/>
+              </a:rPr>
+              <a:t>measured.bv</a:t>
+            </a:r>
+            <a:r>
+              <a:rPr lang="en-US" sz="2600" dirty="0" err="1">
+                <a:latin typeface="Avenir Black"/>
+                <a:cs typeface="Avenir Black"/>
+              </a:rPr>
+              <a:t>+</a:t>
+            </a:r>
+            <a:r>
+              <a:rPr lang="en-US" sz="2600" dirty="0" err="1" smtClean="0">
+                <a:latin typeface="Avenir Black"/>
+                <a:cs typeface="Avenir Black"/>
+              </a:rPr>
+              <a:t>coef</a:t>
+            </a:r>
+            <a:r>
+              <a:rPr lang="en-US" sz="2600" dirty="0" smtClean="0">
+                <a:latin typeface="Avenir Black"/>
+                <a:cs typeface="Avenir Black"/>
+              </a:rPr>
+              <a:t>(DOY-Constant )</a:t>
+            </a:r>
+            <a:endParaRPr lang="en-US" sz="2600" dirty="0" smtClean="0">
+              <a:latin typeface="Avenir Black"/>
+              <a:cs typeface="Avenir Black"/>
+            </a:endParaRPr>
           </a:p>
         </p:txBody>
       </p:sp>
@@ -4423,7 +4865,7 @@
         <p:spPr>
           <a:xfrm>
             <a:off x="457200" y="162570"/>
-            <a:ext cx="7237113" cy="472446"/>
+            <a:ext cx="7237113" cy="353392"/>
           </a:xfrm>
         </p:spPr>
         <p:txBody>
@@ -4434,7 +4876,11 @@
           <a:p>
             <a:r>
               <a:rPr lang="en-US" dirty="0" smtClean="0"/>
-              <a:t>Fake data:</a:t>
+              <a:t>Fake data</a:t>
+            </a:r>
+            <a:r>
+              <a:rPr lang="en-US" dirty="0" smtClean="0"/>
+              <a:t>: Varying intercept</a:t>
             </a:r>
             <a:endParaRPr lang="en-US" dirty="0"/>
           </a:p>
@@ -4629,42 +5075,22 @@
         </p:blipFill>
         <p:spPr>
           <a:xfrm>
-            <a:off x="1377702" y="719068"/>
-            <a:ext cx="5971121" cy="5388345"/>
+            <a:off x="1071482" y="719068"/>
+            <a:ext cx="6462533" cy="5831796"/>
           </a:xfrm>
           <a:prstGeom prst="rect">
             <a:avLst/>
           </a:prstGeom>
-          <a:solidFill>
-            <a:srgbClr val="FFFFFF">
-              <a:shade val="85000"/>
-            </a:srgbClr>
-          </a:solidFill>
-          <a:ln w="88900" cap="sq">
-            <a:solidFill>
-              <a:srgbClr val="FFFFFF"/>
-            </a:solidFill>
-            <a:miter lim="800000"/>
+          <a:ln>
+            <a:noFill/>
           </a:ln>
           <a:effectLst>
-            <a:outerShdw blurRad="55000" dist="18000" dir="5400000" algn="tl" rotWithShape="0">
-              <a:srgbClr val="000000">
-                <a:alpha val="40000"/>
+            <a:outerShdw blurRad="292100" dist="139700" dir="2700000" algn="tl" rotWithShape="0">
+              <a:srgbClr val="333333">
+                <a:alpha val="65000"/>
               </a:srgbClr>
             </a:outerShdw>
           </a:effectLst>
-          <a:scene3d>
-            <a:camera prst="orthographicFront"/>
-            <a:lightRig rig="twoPt" dir="t">
-              <a:rot lat="0" lon="0" rev="7200000"/>
-            </a:lightRig>
-          </a:scene3d>
-          <a:sp3d>
-            <a:bevelT w="25400" h="19050"/>
-            <a:contourClr>
-              <a:srgbClr val="FFFFFF"/>
-            </a:contourClr>
-          </a:sp3d>
         </p:spPr>
       </p:pic>
     </p:spTree>
@@ -4726,36 +5152,16 @@
           <a:prstGeom prst="rect">
             <a:avLst/>
           </a:prstGeom>
-          <a:solidFill>
-            <a:srgbClr val="FFFFFF">
-              <a:shade val="85000"/>
-            </a:srgbClr>
-          </a:solidFill>
-          <a:ln w="88900" cap="sq">
-            <a:solidFill>
-              <a:srgbClr val="FFFFFF"/>
-            </a:solidFill>
-            <a:miter lim="800000"/>
+          <a:ln>
+            <a:noFill/>
           </a:ln>
           <a:effectLst>
-            <a:outerShdw blurRad="55000" dist="18000" dir="5400000" algn="tl" rotWithShape="0">
-              <a:srgbClr val="000000">
-                <a:alpha val="40000"/>
+            <a:outerShdw blurRad="292100" dist="139700" dir="2700000" algn="tl" rotWithShape="0">
+              <a:srgbClr val="333333">
+                <a:alpha val="65000"/>
               </a:srgbClr>
             </a:outerShdw>
           </a:effectLst>
-          <a:scene3d>
-            <a:camera prst="orthographicFront"/>
-            <a:lightRig rig="twoPt" dir="t">
-              <a:rot lat="0" lon="0" rev="7200000"/>
-            </a:lightRig>
-          </a:scene3d>
-          <a:sp3d>
-            <a:bevelT w="25400" h="19050"/>
-            <a:contourClr>
-              <a:srgbClr val="FFFFFF"/>
-            </a:contourClr>
-          </a:sp3d>
         </p:spPr>
       </p:pic>
       <p:pic>
@@ -4786,36 +5192,16 @@
           <a:prstGeom prst="rect">
             <a:avLst/>
           </a:prstGeom>
-          <a:solidFill>
-            <a:srgbClr val="FFFFFF">
-              <a:shade val="85000"/>
-            </a:srgbClr>
-          </a:solidFill>
-          <a:ln w="88900" cap="sq">
-            <a:solidFill>
-              <a:srgbClr val="FFFFFF"/>
-            </a:solidFill>
-            <a:miter lim="800000"/>
+          <a:ln>
+            <a:noFill/>
           </a:ln>
           <a:effectLst>
-            <a:outerShdw blurRad="55000" dist="18000" dir="5400000" algn="tl" rotWithShape="0">
-              <a:srgbClr val="000000">
-                <a:alpha val="40000"/>
+            <a:outerShdw blurRad="292100" dist="139700" dir="2700000" algn="tl" rotWithShape="0">
+              <a:srgbClr val="333333">
+                <a:alpha val="65000"/>
               </a:srgbClr>
             </a:outerShdw>
           </a:effectLst>
-          <a:scene3d>
-            <a:camera prst="orthographicFront"/>
-            <a:lightRig rig="twoPt" dir="t">
-              <a:rot lat="0" lon="0" rev="7200000"/>
-            </a:lightRig>
-          </a:scene3d>
-          <a:sp3d>
-            <a:bevelT w="25400" h="19050"/>
-            <a:contourClr>
-              <a:srgbClr val="FFFFFF"/>
-            </a:contourClr>
-          </a:sp3d>
         </p:spPr>
       </p:pic>
     </p:spTree>
@@ -4899,42 +5285,22 @@
         </p:blipFill>
         <p:spPr>
           <a:xfrm>
-            <a:off x="541239" y="1118790"/>
+            <a:off x="541239" y="848915"/>
             <a:ext cx="7760028" cy="1813502"/>
           </a:xfrm>
           <a:prstGeom prst="rect">
             <a:avLst/>
           </a:prstGeom>
-          <a:solidFill>
-            <a:srgbClr val="FFFFFF">
-              <a:shade val="85000"/>
-            </a:srgbClr>
-          </a:solidFill>
-          <a:ln w="88900" cap="sq">
-            <a:solidFill>
-              <a:srgbClr val="FFFFFF"/>
-            </a:solidFill>
-            <a:miter lim="800000"/>
+          <a:ln>
+            <a:noFill/>
           </a:ln>
           <a:effectLst>
-            <a:outerShdw blurRad="55000" dist="18000" dir="5400000" algn="tl" rotWithShape="0">
-              <a:srgbClr val="000000">
-                <a:alpha val="40000"/>
+            <a:outerShdw blurRad="292100" dist="139700" dir="2700000" algn="tl" rotWithShape="0">
+              <a:srgbClr val="333333">
+                <a:alpha val="65000"/>
               </a:srgbClr>
             </a:outerShdw>
           </a:effectLst>
-          <a:scene3d>
-            <a:camera prst="orthographicFront"/>
-            <a:lightRig rig="twoPt" dir="t">
-              <a:rot lat="0" lon="0" rev="7200000"/>
-            </a:lightRig>
-          </a:scene3d>
-          <a:sp3d>
-            <a:bevelT w="25400" h="19050"/>
-            <a:contourClr>
-              <a:srgbClr val="FFFFFF"/>
-            </a:contourClr>
-          </a:sp3d>
         </p:spPr>
       </p:pic>
       <p:pic>
@@ -4959,44 +5325,62 @@
         </p:blipFill>
         <p:spPr>
           <a:xfrm>
-            <a:off x="541239" y="3301842"/>
+            <a:off x="366614" y="2866978"/>
             <a:ext cx="8273253" cy="2999196"/>
           </a:xfrm>
           <a:prstGeom prst="rect">
             <a:avLst/>
           </a:prstGeom>
-          <a:solidFill>
-            <a:srgbClr val="FFFFFF">
-              <a:shade val="85000"/>
-            </a:srgbClr>
-          </a:solidFill>
-          <a:ln w="88900" cap="sq">
-            <a:solidFill>
-              <a:srgbClr val="FFFFFF"/>
-            </a:solidFill>
-            <a:miter lim="800000"/>
+          <a:ln>
+            <a:noFill/>
           </a:ln>
           <a:effectLst>
-            <a:outerShdw blurRad="55000" dist="18000" dir="5400000" algn="tl" rotWithShape="0">
-              <a:srgbClr val="000000">
-                <a:alpha val="40000"/>
+            <a:outerShdw blurRad="292100" dist="139700" dir="2700000" algn="tl" rotWithShape="0">
+              <a:srgbClr val="333333">
+                <a:alpha val="65000"/>
               </a:srgbClr>
             </a:outerShdw>
           </a:effectLst>
-          <a:scene3d>
-            <a:camera prst="orthographicFront"/>
-            <a:lightRig rig="twoPt" dir="t">
-              <a:rot lat="0" lon="0" rev="7200000"/>
-            </a:lightRig>
-          </a:scene3d>
-          <a:sp3d>
-            <a:bevelT w="25400" h="19050"/>
-            <a:contourClr>
-              <a:srgbClr val="FFFFFF"/>
-            </a:contourClr>
-          </a:sp3d>
         </p:spPr>
       </p:pic>
+      <p:sp>
+        <p:nvSpPr>
+          <p:cNvPr id="3" name="TextBox 2"/>
+          <p:cNvSpPr txBox="1"/>
+          <p:nvPr/>
+        </p:nvSpPr>
+        <p:spPr>
+          <a:xfrm>
+            <a:off x="3667590" y="5959348"/>
+            <a:ext cx="3960038" cy="923330"/>
+          </a:xfrm>
+          <a:prstGeom prst="rect">
+            <a:avLst/>
+          </a:prstGeom>
+          <a:noFill/>
+        </p:spPr>
+        <p:txBody>
+          <a:bodyPr wrap="none" rtlCol="0">
+            <a:spAutoFit/>
+          </a:bodyPr>
+          <a:lstStyle/>
+          <a:p>
+            <a:r>
+              <a:rPr lang="en-US" dirty="0" smtClean="0"/>
+              <a:t>How to account for error on coefficient?</a:t>
+            </a:r>
+          </a:p>
+          <a:p>
+            <a:r>
+              <a:rPr lang="en-US" dirty="0" smtClean="0"/>
+              <a:t>Is there a less hacky way to do this?</a:t>
+            </a:r>
+          </a:p>
+          <a:p>
+            <a:endParaRPr lang="en-US" dirty="0"/>
+          </a:p>
+        </p:txBody>
+      </p:sp>
     </p:spTree>
     <p:extLst>
       <p:ext uri="{BB962C8B-B14F-4D97-AF65-F5344CB8AC3E}">
@@ -5027,14 +5411,114 @@
           <a:chExt cx="0" cy="0"/>
         </a:xfrm>
       </p:grpSpPr>
+      <p:sp>
+        <p:nvSpPr>
+          <p:cNvPr id="2" name="Title 1"/>
+          <p:cNvSpPr>
+            <a:spLocks noGrp="1"/>
+          </p:cNvSpPr>
+          <p:nvPr>
+            <p:ph type="title"/>
+          </p:nvPr>
+        </p:nvSpPr>
+        <p:spPr>
+          <a:xfrm>
+            <a:off x="457200" y="195258"/>
+            <a:ext cx="8229600" cy="704368"/>
+          </a:xfrm>
+        </p:spPr>
+        <p:txBody>
+          <a:bodyPr>
+            <a:normAutofit fontScale="90000"/>
+          </a:bodyPr>
+          <a:lstStyle/>
+          <a:p>
+            <a:r>
+              <a:rPr lang="en-US" dirty="0" smtClean="0"/>
+              <a:t>Fake Data: Varying slope &amp; intercept</a:t>
+            </a:r>
+            <a:endParaRPr lang="en-US" dirty="0"/>
+          </a:p>
+        </p:txBody>
+      </p:sp>
       <p:pic>
         <p:nvPicPr>
-          <p:cNvPr id="5" name="Content Placeholder 4" descr="complete_pool_real.pdf"/>
+          <p:cNvPr id="3" name="Picture 2" descr="Screen Shot 2017-10-31 at 4.38.20 PM.png"/>
+          <p:cNvPicPr>
+            <a:picLocks noChangeAspect="1"/>
+          </p:cNvPicPr>
+          <p:nvPr/>
+        </p:nvPicPr>
+        <p:blipFill>
+          <a:blip r:embed="rId2">
+            <a:extLst>
+              <a:ext uri="{28A0092B-C50C-407E-A947-70E740481C1C}">
+                <a14:useLocalDpi xmlns:a14="http://schemas.microsoft.com/office/drawing/2010/main" val="0"/>
+              </a:ext>
+            </a:extLst>
+          </a:blip>
+          <a:stretch>
+            <a:fillRect/>
+          </a:stretch>
+        </p:blipFill>
+        <p:spPr>
+          <a:xfrm>
+            <a:off x="784226" y="906466"/>
+            <a:ext cx="7518400" cy="5708073"/>
+          </a:xfrm>
+          <a:prstGeom prst="rect">
+            <a:avLst/>
+          </a:prstGeom>
+          <a:ln>
+            <a:noFill/>
+          </a:ln>
+          <a:effectLst>
+            <a:outerShdw blurRad="292100" dist="139700" dir="2700000" algn="tl" rotWithShape="0">
+              <a:srgbClr val="333333">
+                <a:alpha val="65000"/>
+              </a:srgbClr>
+            </a:outerShdw>
+          </a:effectLst>
+        </p:spPr>
+      </p:pic>
+    </p:spTree>
+    <p:extLst>
+      <p:ext uri="{BB962C8B-B14F-4D97-AF65-F5344CB8AC3E}">
+        <p14:creationId xmlns:p14="http://schemas.microsoft.com/office/powerpoint/2010/main" val="3916790775"/>
+      </p:ext>
+    </p:extLst>
+  </p:cSld>
+  <p:clrMapOvr>
+    <a:masterClrMapping/>
+  </p:clrMapOvr>
+</p:sld>
+</file>
+
+<file path=ppt/slides/slide9.xml><?xml version="1.0" encoding="utf-8"?>
+<p:sld xmlns:a="http://schemas.openxmlformats.org/drawingml/2006/main" xmlns:r="http://schemas.openxmlformats.org/officeDocument/2006/relationships" xmlns:p="http://schemas.openxmlformats.org/presentationml/2006/main">
+  <p:cSld>
+    <p:spTree>
+      <p:nvGrpSpPr>
+        <p:cNvPr id="1" name=""/>
+        <p:cNvGrpSpPr/>
+        <p:nvPr/>
+      </p:nvGrpSpPr>
+      <p:grpSpPr>
+        <a:xfrm>
+          <a:off x="0" y="0"/>
+          <a:ext cx="0" cy="0"/>
+          <a:chOff x="0" y="0"/>
+          <a:chExt cx="0" cy="0"/>
+        </a:xfrm>
+      </p:grpSpPr>
+      <p:pic>
+        <p:nvPicPr>
+          <p:cNvPr id="4" name="Content Placeholder 3" descr="weird_ppcheck.pdf"/>
           <p:cNvPicPr>
             <a:picLocks noGrp="1" noChangeAspect="1"/>
           </p:cNvPicPr>
           <p:nvPr>
-            <p:ph sz="half" idx="2"/>
+            <p:ph idx="1"/>
           </p:nvPr>
         </p:nvPicPr>
         <p:blipFill rotWithShape="1">
@@ -5045,52 +5529,32 @@
               </a:ext>
             </a:extLst>
           </a:blip>
-          <a:srcRect t="-1863" b="-986"/>
+          <a:srcRect l="943" r="-142"/>
           <a:stretch/>
         </p:blipFill>
         <p:spPr>
           <a:xfrm>
-            <a:off x="1818859" y="1615588"/>
-            <a:ext cx="5557970" cy="4417136"/>
+            <a:off x="1317627" y="1600200"/>
+            <a:ext cx="6651624" cy="5181362"/>
           </a:xfrm>
           <a:prstGeom prst="rect">
             <a:avLst/>
           </a:prstGeom>
-          <a:solidFill>
-            <a:srgbClr val="FFFFFF">
-              <a:shade val="85000"/>
-            </a:srgbClr>
-          </a:solidFill>
-          <a:ln w="88900" cap="sq">
-            <a:solidFill>
-              <a:srgbClr val="FFFFFF"/>
-            </a:solidFill>
-            <a:miter lim="800000"/>
+          <a:ln>
+            <a:noFill/>
           </a:ln>
           <a:effectLst>
-            <a:outerShdw blurRad="55000" dist="18000" dir="5400000" algn="tl" rotWithShape="0">
-              <a:srgbClr val="000000">
-                <a:alpha val="40000"/>
+            <a:outerShdw blurRad="292100" dist="139700" dir="2700000" algn="tl" rotWithShape="0">
+              <a:srgbClr val="333333">
+                <a:alpha val="65000"/>
               </a:srgbClr>
             </a:outerShdw>
           </a:effectLst>
-          <a:scene3d>
-            <a:camera prst="orthographicFront"/>
-            <a:lightRig rig="twoPt" dir="t">
-              <a:rot lat="0" lon="0" rev="7200000"/>
-            </a:lightRig>
-          </a:scene3d>
-          <a:sp3d>
-            <a:bevelT w="25400" h="19050"/>
-            <a:contourClr>
-              <a:srgbClr val="FFFFFF"/>
-            </a:contourClr>
-          </a:sp3d>
         </p:spPr>
       </p:pic>
       <p:pic>
         <p:nvPicPr>
-          <p:cNvPr id="7" name="Picture 6" descr="Screen Shot 2017-10-30 at 4.41.32 PM.png"/>
+          <p:cNvPr id="5" name="Picture 4" descr="Screen Shot 2017-10-31 at 4.38.56 PM.png"/>
           <p:cNvPicPr>
             <a:picLocks noChangeAspect="1"/>
           </p:cNvPicPr>
@@ -5110,48 +5574,28 @@
         </p:blipFill>
         <p:spPr>
           <a:xfrm>
-            <a:off x="133063" y="504933"/>
-            <a:ext cx="8581400" cy="821669"/>
+            <a:off x="1590675" y="225425"/>
+            <a:ext cx="5600700" cy="1104900"/>
           </a:xfrm>
           <a:prstGeom prst="rect">
             <a:avLst/>
           </a:prstGeom>
-          <a:solidFill>
-            <a:srgbClr val="FFFFFF">
-              <a:shade val="85000"/>
-            </a:srgbClr>
-          </a:solidFill>
-          <a:ln w="88900" cap="sq">
-            <a:solidFill>
-              <a:srgbClr val="FFFFFF"/>
-            </a:solidFill>
-            <a:miter lim="800000"/>
+          <a:ln>
+            <a:noFill/>
           </a:ln>
           <a:effectLst>
-            <a:outerShdw blurRad="55000" dist="18000" dir="5400000" algn="tl" rotWithShape="0">
-              <a:srgbClr val="000000">
-                <a:alpha val="40000"/>
+            <a:outerShdw blurRad="292100" dist="139700" dir="2700000" algn="tl" rotWithShape="0">
+              <a:srgbClr val="333333">
+                <a:alpha val="65000"/>
               </a:srgbClr>
             </a:outerShdw>
           </a:effectLst>
-          <a:scene3d>
-            <a:camera prst="orthographicFront"/>
-            <a:lightRig rig="twoPt" dir="t">
-              <a:rot lat="0" lon="0" rev="7200000"/>
-            </a:lightRig>
-          </a:scene3d>
-          <a:sp3d>
-            <a:bevelT w="25400" h="19050"/>
-            <a:contourClr>
-              <a:srgbClr val="FFFFFF"/>
-            </a:contourClr>
-          </a:sp3d>
         </p:spPr>
       </p:pic>
     </p:spTree>
     <p:extLst>
       <p:ext uri="{BB962C8B-B14F-4D97-AF65-F5344CB8AC3E}">
-        <p14:creationId xmlns:p14="http://schemas.microsoft.com/office/powerpoint/2010/main" val="1716828572"/>
+        <p14:creationId xmlns:p14="http://schemas.microsoft.com/office/powerpoint/2010/main" val="301475447"/>
       </p:ext>
     </p:extLst>
   </p:cSld>

</xml_diff>